<commit_message>
tugas 8 dan 9
</commit_message>
<xml_diff>
--- a/M8/Ethereum Tutorial Tugas 8_Hanif Shafwan Mahib_1103194150.pptx
+++ b/M8/Ethereum Tutorial Tugas 8_Hanif Shafwan Mahib_1103194150.pptx
@@ -13,6 +13,7 @@
     <p:sldId id="261" r:id="rId7"/>
     <p:sldId id="262" r:id="rId8"/>
     <p:sldId id="263" r:id="rId9"/>
+    <p:sldId id="264" r:id="rId10"/>
   </p:sldIdLst>
   <p:sldSz cx="12192000" cy="6858000"/>
   <p:notesSz cx="6858000" cy="9144000"/>
@@ -111,6 +112,11 @@
       </a:defRPr>
     </a:lvl9pPr>
   </p:defaultTextStyle>
+  <p:extLst>
+    <p:ext uri="{EFAFB233-063F-42B5-8137-9DF3F51BA10A}">
+      <p15:sldGuideLst xmlns:p15="http://schemas.microsoft.com/office/powerpoint/2012/main"/>
+    </p:ext>
+  </p:extLst>
 </p:presentation>
 </file>
 
@@ -6654,6 +6660,1056 @@
 </p:sld>
 </file>
 
+<file path=ppt/slides/slide9.xml><?xml version="1.0" encoding="utf-8"?>
+<p:sld xmlns:a="http://schemas.openxmlformats.org/drawingml/2006/main" xmlns:r="http://schemas.openxmlformats.org/officeDocument/2006/relationships" xmlns:p="http://schemas.openxmlformats.org/presentationml/2006/main">
+  <p:cSld>
+    <p:bg>
+      <p:bgPr>
+        <a:solidFill>
+          <a:schemeClr val="bg2"/>
+        </a:solidFill>
+        <a:effectLst/>
+      </p:bgPr>
+    </p:bg>
+    <p:spTree>
+      <p:nvGrpSpPr>
+        <p:cNvPr id="1" name=""/>
+        <p:cNvGrpSpPr/>
+        <p:nvPr/>
+      </p:nvGrpSpPr>
+      <p:grpSpPr>
+        <a:xfrm>
+          <a:off x="0" y="0"/>
+          <a:ext cx="0" cy="0"/>
+          <a:chOff x="0" y="0"/>
+          <a:chExt cx="0" cy="0"/>
+        </a:xfrm>
+      </p:grpSpPr>
+      <p:sp>
+        <p:nvSpPr>
+          <p:cNvPr id="7" name="Freeform: Shape 6">
+            <a:extLst>
+              <a:ext uri="{FF2B5EF4-FFF2-40B4-BE49-F238E27FC236}">
+                <a16:creationId xmlns:a16="http://schemas.microsoft.com/office/drawing/2014/main" id="{A6EF5A53-0A64-4CA5-B9C7-1CB97CB5CF1C}"/>
+              </a:ext>
+              <a:ext uri="{C183D7F6-B498-43B3-948B-1728B52AA6E4}">
+                <adec:decorative xmlns:adec="http://schemas.microsoft.com/office/drawing/2017/decorative" val="1"/>
+              </a:ext>
+            </a:extLst>
+          </p:cNvPr>
+          <p:cNvSpPr>
+            <a:spLocks noGrp="1" noRot="1" noChangeAspect="1" noMove="1" noResize="1" noEditPoints="1" noAdjustHandles="1" noChangeArrowheads="1" noChangeShapeType="1" noTextEdit="1"/>
+          </p:cNvSpPr>
+          <p:nvPr>
+            <p:extLst>
+              <p:ext uri="{386F3935-93C4-4BCD-93E2-E3B085C9AB24}">
+                <p16:designElem xmlns:p16="http://schemas.microsoft.com/office/powerpoint/2015/main" val="1"/>
+              </p:ext>
+            </p:extLst>
+          </p:nvPr>
+        </p:nvSpPr>
+        <p:spPr>
+          <a:xfrm>
+            <a:off x="8157843" y="6244836"/>
+            <a:ext cx="4034156" cy="613164"/>
+          </a:xfrm>
+          <a:custGeom>
+            <a:avLst/>
+            <a:gdLst>
+              <a:gd name="connsiteX0" fmla="*/ 1479137 w 4034156"/>
+              <a:gd name="connsiteY0" fmla="*/ 230 h 613164"/>
+              <a:gd name="connsiteX1" fmla="*/ 3482844 w 4034156"/>
+              <a:gd name="connsiteY1" fmla="*/ 298555 h 613164"/>
+              <a:gd name="connsiteX2" fmla="*/ 3831590 w 4034156"/>
+              <a:gd name="connsiteY2" fmla="*/ 425010 h 613164"/>
+              <a:gd name="connsiteX3" fmla="*/ 4034156 w 4034156"/>
+              <a:gd name="connsiteY3" fmla="*/ 494088 h 613164"/>
+              <a:gd name="connsiteX4" fmla="*/ 4034156 w 4034156"/>
+              <a:gd name="connsiteY4" fmla="*/ 613164 h 613164"/>
+              <a:gd name="connsiteX5" fmla="*/ 0 w 4034156"/>
+              <a:gd name="connsiteY5" fmla="*/ 613164 h 613164"/>
+              <a:gd name="connsiteX6" fmla="*/ 54792 w 4034156"/>
+              <a:gd name="connsiteY6" fmla="*/ 512415 h 613164"/>
+              <a:gd name="connsiteX7" fmla="*/ 168327 w 4034156"/>
+              <a:gd name="connsiteY7" fmla="*/ 366637 h 613164"/>
+              <a:gd name="connsiteX8" fmla="*/ 1192562 w 4034156"/>
+              <a:gd name="connsiteY8" fmla="*/ 1522 h 613164"/>
+              <a:gd name="connsiteX9" fmla="*/ 1479137 w 4034156"/>
+              <a:gd name="connsiteY9" fmla="*/ 230 h 613164"/>
+            </a:gdLst>
+            <a:ahLst/>
+            <a:cxnLst>
+              <a:cxn ang="0">
+                <a:pos x="connsiteX0" y="connsiteY0"/>
+              </a:cxn>
+              <a:cxn ang="0">
+                <a:pos x="connsiteX1" y="connsiteY1"/>
+              </a:cxn>
+              <a:cxn ang="0">
+                <a:pos x="connsiteX2" y="connsiteY2"/>
+              </a:cxn>
+              <a:cxn ang="0">
+                <a:pos x="connsiteX3" y="connsiteY3"/>
+              </a:cxn>
+              <a:cxn ang="0">
+                <a:pos x="connsiteX4" y="connsiteY4"/>
+              </a:cxn>
+              <a:cxn ang="0">
+                <a:pos x="connsiteX5" y="connsiteY5"/>
+              </a:cxn>
+              <a:cxn ang="0">
+                <a:pos x="connsiteX6" y="connsiteY6"/>
+              </a:cxn>
+              <a:cxn ang="0">
+                <a:pos x="connsiteX7" y="connsiteY7"/>
+              </a:cxn>
+              <a:cxn ang="0">
+                <a:pos x="connsiteX8" y="connsiteY8"/>
+              </a:cxn>
+              <a:cxn ang="0">
+                <a:pos x="connsiteX9" y="connsiteY9"/>
+              </a:cxn>
+            </a:cxnLst>
+            <a:rect l="l" t="t" r="r" b="b"/>
+            <a:pathLst>
+              <a:path w="4034156" h="613164">
+                <a:moveTo>
+                  <a:pt x="1479137" y="230"/>
+                </a:moveTo>
+                <a:cubicBezTo>
+                  <a:pt x="2152575" y="4287"/>
+                  <a:pt x="2854487" y="63583"/>
+                  <a:pt x="3482844" y="298555"/>
+                </a:cubicBezTo>
+                <a:cubicBezTo>
+                  <a:pt x="3599338" y="342114"/>
+                  <a:pt x="3715540" y="384216"/>
+                  <a:pt x="3831590" y="425010"/>
+                </a:cubicBezTo>
+                <a:lnTo>
+                  <a:pt x="4034156" y="494088"/>
+                </a:lnTo>
+                <a:lnTo>
+                  <a:pt x="4034156" y="613164"/>
+                </a:lnTo>
+                <a:lnTo>
+                  <a:pt x="0" y="613164"/>
+                </a:lnTo>
+                <a:lnTo>
+                  <a:pt x="54792" y="512415"/>
+                </a:lnTo>
+                <a:cubicBezTo>
+                  <a:pt x="88888" y="459433"/>
+                  <a:pt x="126502" y="410480"/>
+                  <a:pt x="168327" y="366637"/>
+                </a:cubicBezTo>
+                <a:cubicBezTo>
+                  <a:pt x="428292" y="94062"/>
+                  <a:pt x="821899" y="6565"/>
+                  <a:pt x="1192562" y="1522"/>
+                </a:cubicBezTo>
+                <a:cubicBezTo>
+                  <a:pt x="1287308" y="198"/>
+                  <a:pt x="1382932" y="-349"/>
+                  <a:pt x="1479137" y="230"/>
+                </a:cubicBezTo>
+                <a:close/>
+              </a:path>
+            </a:pathLst>
+          </a:custGeom>
+          <a:solidFill>
+            <a:schemeClr val="accent6"/>
+          </a:solidFill>
+          <a:ln>
+            <a:noFill/>
+          </a:ln>
+        </p:spPr>
+        <p:style>
+          <a:lnRef idx="2">
+            <a:schemeClr val="accent1">
+              <a:shade val="50000"/>
+            </a:schemeClr>
+          </a:lnRef>
+          <a:fillRef idx="1">
+            <a:schemeClr val="accent1"/>
+          </a:fillRef>
+          <a:effectRef idx="0">
+            <a:schemeClr val="accent1"/>
+          </a:effectRef>
+          <a:fontRef idx="minor">
+            <a:schemeClr val="lt1"/>
+          </a:fontRef>
+        </p:style>
+        <p:txBody>
+          <a:bodyPr wrap="square" rtlCol="0" anchor="ctr">
+            <a:noAutofit/>
+          </a:bodyPr>
+          <a:lstStyle/>
+          <a:p>
+            <a:pPr marL="0" marR="0" lvl="0" indent="0" algn="ctr" defTabSz="914400" rtl="0" eaLnBrk="1" fontAlgn="auto" latinLnBrk="0" hangingPunct="1">
+              <a:lnSpc>
+                <a:spcPct val="100000"/>
+              </a:lnSpc>
+              <a:spcBef>
+                <a:spcPts val="0"/>
+              </a:spcBef>
+              <a:spcAft>
+                <a:spcPts val="0"/>
+              </a:spcAft>
+              <a:buClrTx/>
+              <a:buSzTx/>
+              <a:buFontTx/>
+              <a:buNone/>
+              <a:tabLst/>
+              <a:defRPr/>
+            </a:pPr>
+            <a:endParaRPr kumimoji="0" lang="en-US" sz="1500" b="0" i="0" u="none" strike="noStrike" kern="1200" cap="none" spc="0" normalizeH="0" baseline="0" noProof="0">
+              <a:ln>
+                <a:noFill/>
+              </a:ln>
+              <a:solidFill>
+                <a:prstClr val="white"/>
+              </a:solidFill>
+              <a:effectLst/>
+              <a:uLnTx/>
+              <a:uFillTx/>
+              <a:latin typeface="Avenir Next LT Pro" panose="020B0504020202020204" pitchFamily="34" charset="0"/>
+              <a:ea typeface="+mn-ea"/>
+              <a:cs typeface="+mn-cs"/>
+            </a:endParaRPr>
+          </a:p>
+        </p:txBody>
+      </p:sp>
+      <p:sp>
+        <p:nvSpPr>
+          <p:cNvPr id="9" name="Freeform: Shape 8">
+            <a:extLst>
+              <a:ext uri="{FF2B5EF4-FFF2-40B4-BE49-F238E27FC236}">
+                <a16:creationId xmlns:a16="http://schemas.microsoft.com/office/drawing/2014/main" id="{34ABFBEA-4EB0-4D02-A2C0-1733CD3D6F12}"/>
+              </a:ext>
+              <a:ext uri="{C183D7F6-B498-43B3-948B-1728B52AA6E4}">
+                <adec:decorative xmlns:adec="http://schemas.microsoft.com/office/drawing/2017/decorative" val="1"/>
+              </a:ext>
+            </a:extLst>
+          </p:cNvPr>
+          <p:cNvSpPr>
+            <a:spLocks noGrp="1" noRot="1" noChangeAspect="1" noMove="1" noResize="1" noEditPoints="1" noAdjustHandles="1" noChangeArrowheads="1" noChangeShapeType="1" noTextEdit="1"/>
+          </p:cNvSpPr>
+          <p:nvPr>
+            <p:extLst>
+              <p:ext uri="{386F3935-93C4-4BCD-93E2-E3B085C9AB24}">
+                <p16:designElem xmlns:p16="http://schemas.microsoft.com/office/powerpoint/2015/main" val="1"/>
+              </p:ext>
+            </p:extLst>
+          </p:nvPr>
+        </p:nvSpPr>
+        <p:spPr>
+          <a:xfrm>
+            <a:off x="1" y="688126"/>
+            <a:ext cx="448491" cy="1634252"/>
+          </a:xfrm>
+          <a:custGeom>
+            <a:avLst/>
+            <a:gdLst>
+              <a:gd name="connsiteX0" fmla="*/ 0 w 448491"/>
+              <a:gd name="connsiteY0" fmla="*/ 0 h 1634252"/>
+              <a:gd name="connsiteX1" fmla="*/ 12983 w 448491"/>
+              <a:gd name="connsiteY1" fmla="*/ 10508 h 1634252"/>
+              <a:gd name="connsiteX2" fmla="*/ 441611 w 448491"/>
+              <a:gd name="connsiteY2" fmla="*/ 863751 h 1634252"/>
+              <a:gd name="connsiteX3" fmla="*/ 251011 w 448491"/>
+              <a:gd name="connsiteY3" fmla="*/ 1302895 h 1634252"/>
+              <a:gd name="connsiteX4" fmla="*/ 74605 w 448491"/>
+              <a:gd name="connsiteY4" fmla="*/ 1543249 h 1634252"/>
+              <a:gd name="connsiteX5" fmla="*/ 0 w 448491"/>
+              <a:gd name="connsiteY5" fmla="*/ 1634252 h 1634252"/>
+            </a:gdLst>
+            <a:ahLst/>
+            <a:cxnLst>
+              <a:cxn ang="0">
+                <a:pos x="connsiteX0" y="connsiteY0"/>
+              </a:cxn>
+              <a:cxn ang="0">
+                <a:pos x="connsiteX1" y="connsiteY1"/>
+              </a:cxn>
+              <a:cxn ang="0">
+                <a:pos x="connsiteX2" y="connsiteY2"/>
+              </a:cxn>
+              <a:cxn ang="0">
+                <a:pos x="connsiteX3" y="connsiteY3"/>
+              </a:cxn>
+              <a:cxn ang="0">
+                <a:pos x="connsiteX4" y="connsiteY4"/>
+              </a:cxn>
+              <a:cxn ang="0">
+                <a:pos x="connsiteX5" y="connsiteY5"/>
+              </a:cxn>
+            </a:cxnLst>
+            <a:rect l="l" t="t" r="r" b="b"/>
+            <a:pathLst>
+              <a:path w="448491" h="1634252">
+                <a:moveTo>
+                  <a:pt x="0" y="0"/>
+                </a:moveTo>
+                <a:lnTo>
+                  <a:pt x="12983" y="10508"/>
+                </a:lnTo>
+                <a:cubicBezTo>
+                  <a:pt x="278410" y="241022"/>
+                  <a:pt x="489787" y="530267"/>
+                  <a:pt x="441611" y="863751"/>
+                </a:cubicBezTo>
+                <a:cubicBezTo>
+                  <a:pt x="418542" y="1022632"/>
+                  <a:pt x="337007" y="1166302"/>
+                  <a:pt x="251011" y="1302895"/>
+                </a:cubicBezTo>
+                <a:cubicBezTo>
+                  <a:pt x="215138" y="1359902"/>
+                  <a:pt x="154723" y="1442480"/>
+                  <a:pt x="74605" y="1543249"/>
+                </a:cubicBezTo>
+                <a:lnTo>
+                  <a:pt x="0" y="1634252"/>
+                </a:lnTo>
+                <a:close/>
+              </a:path>
+            </a:pathLst>
+          </a:custGeom>
+          <a:solidFill>
+            <a:schemeClr val="accent1"/>
+          </a:solidFill>
+          <a:ln>
+            <a:noFill/>
+          </a:ln>
+        </p:spPr>
+        <p:style>
+          <a:lnRef idx="2">
+            <a:schemeClr val="accent1">
+              <a:shade val="50000"/>
+            </a:schemeClr>
+          </a:lnRef>
+          <a:fillRef idx="1">
+            <a:schemeClr val="accent1"/>
+          </a:fillRef>
+          <a:effectRef idx="0">
+            <a:schemeClr val="accent1"/>
+          </a:effectRef>
+          <a:fontRef idx="minor">
+            <a:schemeClr val="lt1"/>
+          </a:fontRef>
+        </p:style>
+        <p:txBody>
+          <a:bodyPr wrap="square" rtlCol="0" anchor="ctr">
+            <a:noAutofit/>
+          </a:bodyPr>
+          <a:lstStyle/>
+          <a:p>
+            <a:pPr algn="ctr"/>
+            <a:endParaRPr lang="en-US" sz="900">
+              <a:solidFill>
+                <a:prstClr val="white"/>
+              </a:solidFill>
+              <a:latin typeface="Avenir Next LT Pro" panose="020B0504020202020204" pitchFamily="34" charset="0"/>
+            </a:endParaRPr>
+          </a:p>
+        </p:txBody>
+      </p:sp>
+      <p:sp>
+        <p:nvSpPr>
+          <p:cNvPr id="11" name="Freeform: Shape 10">
+            <a:extLst>
+              <a:ext uri="{FF2B5EF4-FFF2-40B4-BE49-F238E27FC236}">
+                <a16:creationId xmlns:a16="http://schemas.microsoft.com/office/drawing/2014/main" id="{19E083F6-57F4-487B-A766-EA0462B1EED8}"/>
+              </a:ext>
+              <a:ext uri="{C183D7F6-B498-43B3-948B-1728B52AA6E4}">
+                <adec:decorative xmlns:adec="http://schemas.microsoft.com/office/drawing/2017/decorative" val="1"/>
+              </a:ext>
+            </a:extLst>
+          </p:cNvPr>
+          <p:cNvSpPr>
+            <a:spLocks noGrp="1" noRot="1" noChangeAspect="1" noMove="1" noResize="1" noEditPoints="1" noAdjustHandles="1" noChangeArrowheads="1" noChangeShapeType="1" noTextEdit="1"/>
+          </p:cNvSpPr>
+          <p:nvPr>
+            <p:extLst>
+              <p:ext uri="{386F3935-93C4-4BCD-93E2-E3B085C9AB24}">
+                <p16:designElem xmlns:p16="http://schemas.microsoft.com/office/powerpoint/2015/main" val="1"/>
+              </p:ext>
+            </p:extLst>
+          </p:nvPr>
+        </p:nvSpPr>
+        <p:spPr>
+          <a:xfrm>
+            <a:off x="7309459" y="6144069"/>
+            <a:ext cx="4418271" cy="718159"/>
+          </a:xfrm>
+          <a:custGeom>
+            <a:avLst/>
+            <a:gdLst>
+              <a:gd name="connsiteX0" fmla="*/ 1421452 w 4590626"/>
+              <a:gd name="connsiteY0" fmla="*/ 0 h 713930"/>
+              <a:gd name="connsiteX1" fmla="*/ 3247781 w 4590626"/>
+              <a:gd name="connsiteY1" fmla="*/ 271915 h 713930"/>
+              <a:gd name="connsiteX2" fmla="*/ 4517331 w 4590626"/>
+              <a:gd name="connsiteY2" fmla="*/ 693394 h 713930"/>
+              <a:gd name="connsiteX3" fmla="*/ 4590626 w 4590626"/>
+              <a:gd name="connsiteY3" fmla="*/ 713930 h 713930"/>
+              <a:gd name="connsiteX4" fmla="*/ 0 w 4590626"/>
+              <a:gd name="connsiteY4" fmla="*/ 713930 h 713930"/>
+              <a:gd name="connsiteX5" fmla="*/ 2854 w 4590626"/>
+              <a:gd name="connsiteY5" fmla="*/ 705624 h 713930"/>
+              <a:gd name="connsiteX6" fmla="*/ 226680 w 4590626"/>
+              <a:gd name="connsiteY6" fmla="*/ 333970 h 713930"/>
+              <a:gd name="connsiteX7" fmla="*/ 1160245 w 4590626"/>
+              <a:gd name="connsiteY7" fmla="*/ 1178 h 713930"/>
+              <a:gd name="connsiteX8" fmla="*/ 1421452 w 4590626"/>
+              <a:gd name="connsiteY8" fmla="*/ 0 h 713930"/>
+              <a:gd name="connsiteX0" fmla="*/ 1421452 w 4517331"/>
+              <a:gd name="connsiteY0" fmla="*/ 0 h 713930"/>
+              <a:gd name="connsiteX1" fmla="*/ 3247781 w 4517331"/>
+              <a:gd name="connsiteY1" fmla="*/ 271915 h 713930"/>
+              <a:gd name="connsiteX2" fmla="*/ 4517331 w 4517331"/>
+              <a:gd name="connsiteY2" fmla="*/ 693394 h 713930"/>
+              <a:gd name="connsiteX3" fmla="*/ 0 w 4517331"/>
+              <a:gd name="connsiteY3" fmla="*/ 713930 h 713930"/>
+              <a:gd name="connsiteX4" fmla="*/ 2854 w 4517331"/>
+              <a:gd name="connsiteY4" fmla="*/ 705624 h 713930"/>
+              <a:gd name="connsiteX5" fmla="*/ 226680 w 4517331"/>
+              <a:gd name="connsiteY5" fmla="*/ 333970 h 713930"/>
+              <a:gd name="connsiteX6" fmla="*/ 1160245 w 4517331"/>
+              <a:gd name="connsiteY6" fmla="*/ 1178 h 713930"/>
+              <a:gd name="connsiteX7" fmla="*/ 1421452 w 4517331"/>
+              <a:gd name="connsiteY7" fmla="*/ 0 h 713930"/>
+              <a:gd name="connsiteX0" fmla="*/ 0 w 4608771"/>
+              <a:gd name="connsiteY0" fmla="*/ 713930 h 784834"/>
+              <a:gd name="connsiteX1" fmla="*/ 2854 w 4608771"/>
+              <a:gd name="connsiteY1" fmla="*/ 705624 h 784834"/>
+              <a:gd name="connsiteX2" fmla="*/ 226680 w 4608771"/>
+              <a:gd name="connsiteY2" fmla="*/ 333970 h 784834"/>
+              <a:gd name="connsiteX3" fmla="*/ 1160245 w 4608771"/>
+              <a:gd name="connsiteY3" fmla="*/ 1178 h 784834"/>
+              <a:gd name="connsiteX4" fmla="*/ 1421452 w 4608771"/>
+              <a:gd name="connsiteY4" fmla="*/ 0 h 784834"/>
+              <a:gd name="connsiteX5" fmla="*/ 3247781 w 4608771"/>
+              <a:gd name="connsiteY5" fmla="*/ 271915 h 784834"/>
+              <a:gd name="connsiteX6" fmla="*/ 4608771 w 4608771"/>
+              <a:gd name="connsiteY6" fmla="*/ 784834 h 784834"/>
+              <a:gd name="connsiteX0" fmla="*/ 0 w 4418271"/>
+              <a:gd name="connsiteY0" fmla="*/ 713930 h 718159"/>
+              <a:gd name="connsiteX1" fmla="*/ 2854 w 4418271"/>
+              <a:gd name="connsiteY1" fmla="*/ 705624 h 718159"/>
+              <a:gd name="connsiteX2" fmla="*/ 226680 w 4418271"/>
+              <a:gd name="connsiteY2" fmla="*/ 333970 h 718159"/>
+              <a:gd name="connsiteX3" fmla="*/ 1160245 w 4418271"/>
+              <a:gd name="connsiteY3" fmla="*/ 1178 h 718159"/>
+              <a:gd name="connsiteX4" fmla="*/ 1421452 w 4418271"/>
+              <a:gd name="connsiteY4" fmla="*/ 0 h 718159"/>
+              <a:gd name="connsiteX5" fmla="*/ 3247781 w 4418271"/>
+              <a:gd name="connsiteY5" fmla="*/ 271915 h 718159"/>
+              <a:gd name="connsiteX6" fmla="*/ 4418271 w 4418271"/>
+              <a:gd name="connsiteY6" fmla="*/ 718159 h 718159"/>
+            </a:gdLst>
+            <a:ahLst/>
+            <a:cxnLst>
+              <a:cxn ang="0">
+                <a:pos x="connsiteX0" y="connsiteY0"/>
+              </a:cxn>
+              <a:cxn ang="0">
+                <a:pos x="connsiteX1" y="connsiteY1"/>
+              </a:cxn>
+              <a:cxn ang="0">
+                <a:pos x="connsiteX2" y="connsiteY2"/>
+              </a:cxn>
+              <a:cxn ang="0">
+                <a:pos x="connsiteX3" y="connsiteY3"/>
+              </a:cxn>
+              <a:cxn ang="0">
+                <a:pos x="connsiteX4" y="connsiteY4"/>
+              </a:cxn>
+              <a:cxn ang="0">
+                <a:pos x="connsiteX5" y="connsiteY5"/>
+              </a:cxn>
+              <a:cxn ang="0">
+                <a:pos x="connsiteX6" y="connsiteY6"/>
+              </a:cxn>
+            </a:cxnLst>
+            <a:rect l="l" t="t" r="r" b="b"/>
+            <a:pathLst>
+              <a:path w="4418271" h="718159">
+                <a:moveTo>
+                  <a:pt x="0" y="713930"/>
+                </a:moveTo>
+                <a:lnTo>
+                  <a:pt x="2854" y="705624"/>
+                </a:lnTo>
+                <a:cubicBezTo>
+                  <a:pt x="60059" y="562888"/>
+                  <a:pt x="131373" y="433874"/>
+                  <a:pt x="226680" y="333970"/>
+                </a:cubicBezTo>
+                <a:cubicBezTo>
+                  <a:pt x="463632" y="85526"/>
+                  <a:pt x="822395" y="5774"/>
+                  <a:pt x="1160245" y="1178"/>
+                </a:cubicBezTo>
+                <a:lnTo>
+                  <a:pt x="1421452" y="0"/>
+                </a:lnTo>
+                <a:cubicBezTo>
+                  <a:pt x="2035274" y="3698"/>
+                  <a:pt x="2748311" y="152222"/>
+                  <a:pt x="3247781" y="271915"/>
+                </a:cubicBezTo>
+                <a:cubicBezTo>
+                  <a:pt x="3747251" y="391608"/>
+                  <a:pt x="3902480" y="501606"/>
+                  <a:pt x="4418271" y="718159"/>
+                </a:cubicBezTo>
+              </a:path>
+            </a:pathLst>
+          </a:custGeom>
+          <a:noFill/>
+          <a:ln>
+            <a:solidFill>
+              <a:schemeClr val="accent4"/>
+            </a:solidFill>
+          </a:ln>
+        </p:spPr>
+        <p:style>
+          <a:lnRef idx="2">
+            <a:schemeClr val="accent1">
+              <a:shade val="50000"/>
+            </a:schemeClr>
+          </a:lnRef>
+          <a:fillRef idx="1">
+            <a:schemeClr val="accent1"/>
+          </a:fillRef>
+          <a:effectRef idx="0">
+            <a:schemeClr val="accent1"/>
+          </a:effectRef>
+          <a:fontRef idx="minor">
+            <a:schemeClr val="lt1"/>
+          </a:fontRef>
+        </p:style>
+        <p:txBody>
+          <a:bodyPr rtlCol="0" anchor="ctr"/>
+          <a:lstStyle/>
+          <a:p>
+            <a:pPr marL="0" marR="0" lvl="0" indent="0" algn="ctr" defTabSz="914400" rtl="0" eaLnBrk="1" fontAlgn="auto" latinLnBrk="0" hangingPunct="1">
+              <a:lnSpc>
+                <a:spcPct val="100000"/>
+              </a:lnSpc>
+              <a:spcBef>
+                <a:spcPts val="0"/>
+              </a:spcBef>
+              <a:spcAft>
+                <a:spcPts val="0"/>
+              </a:spcAft>
+              <a:buClrTx/>
+              <a:buSzTx/>
+              <a:buFontTx/>
+              <a:buNone/>
+              <a:tabLst/>
+              <a:defRPr/>
+            </a:pPr>
+            <a:endParaRPr kumimoji="0" lang="en-US" sz="1800" b="0" i="0" u="none" strike="noStrike" kern="1200" cap="none" spc="0" normalizeH="0" baseline="0" noProof="0">
+              <a:ln>
+                <a:noFill/>
+              </a:ln>
+              <a:solidFill>
+                <a:prstClr val="white"/>
+              </a:solidFill>
+              <a:effectLst/>
+              <a:uLnTx/>
+              <a:uFillTx/>
+              <a:latin typeface="Avenir Next LT Pro Light"/>
+              <a:ea typeface="+mn-ea"/>
+              <a:cs typeface="+mn-cs"/>
+            </a:endParaRPr>
+          </a:p>
+        </p:txBody>
+      </p:sp>
+      <p:sp useBgFill="1">
+        <p:nvSpPr>
+          <p:cNvPr id="13" name="Rectangle 12">
+            <a:extLst>
+              <a:ext uri="{FF2B5EF4-FFF2-40B4-BE49-F238E27FC236}">
+                <a16:creationId xmlns:a16="http://schemas.microsoft.com/office/drawing/2014/main" id="{7A18C9FB-EC4C-4DAE-8F7D-C6E5AF607958}"/>
+              </a:ext>
+              <a:ext uri="{C183D7F6-B498-43B3-948B-1728B52AA6E4}">
+                <adec:decorative xmlns:adec="http://schemas.microsoft.com/office/drawing/2017/decorative" val="1"/>
+              </a:ext>
+            </a:extLst>
+          </p:cNvPr>
+          <p:cNvSpPr>
+            <a:spLocks noGrp="1" noRot="1" noChangeAspect="1" noMove="1" noResize="1" noEditPoints="1" noAdjustHandles="1" noChangeArrowheads="1" noChangeShapeType="1" noTextEdit="1"/>
+          </p:cNvSpPr>
+          <p:nvPr>
+            <p:extLst>
+              <p:ext uri="{386F3935-93C4-4BCD-93E2-E3B085C9AB24}">
+                <p16:designElem xmlns:p16="http://schemas.microsoft.com/office/powerpoint/2015/main" val="1"/>
+              </p:ext>
+            </p:extLst>
+          </p:nvPr>
+        </p:nvSpPr>
+        <p:spPr>
+          <a:xfrm>
+            <a:off x="0" y="0"/>
+            <a:ext cx="12192000" cy="6858000"/>
+          </a:xfrm>
+          <a:prstGeom prst="rect">
+            <a:avLst/>
+          </a:prstGeom>
+          <a:ln w="12700" cap="flat" cmpd="sng" algn="ctr">
+            <a:noFill/>
+            <a:prstDash val="solid"/>
+            <a:miter lim="800000"/>
+          </a:ln>
+          <a:effectLst/>
+          <a:extLst>
+            <a:ext uri="{91240B29-F687-4F45-9708-019B960494DF}">
+              <a14:hiddenLine xmlns:a14="http://schemas.microsoft.com/office/drawing/2010/main" w="12700" cap="flat" cmpd="sng" algn="ctr">
+                <a:solidFill>
+                  <a:schemeClr val="accent1">
+                    <a:shade val="50000"/>
+                  </a:schemeClr>
+                </a:solidFill>
+                <a:prstDash val="solid"/>
+                <a:miter lim="800000"/>
+              </a14:hiddenLine>
+            </a:ext>
+          </a:extLst>
+        </p:spPr>
+        <p:style>
+          <a:lnRef idx="2">
+            <a:schemeClr val="accent1">
+              <a:shade val="50000"/>
+            </a:schemeClr>
+          </a:lnRef>
+          <a:fillRef idx="1">
+            <a:schemeClr val="accent1"/>
+          </a:fillRef>
+          <a:effectRef idx="0">
+            <a:schemeClr val="accent1"/>
+          </a:effectRef>
+          <a:fontRef idx="minor">
+            <a:schemeClr val="lt1"/>
+          </a:fontRef>
+        </p:style>
+        <p:txBody>
+          <a:bodyPr rtlCol="0" anchor="ctr"/>
+          <a:lstStyle/>
+          <a:p>
+            <a:endParaRPr lang="en-US" dirty="0"/>
+          </a:p>
+        </p:txBody>
+      </p:sp>
+      <p:sp>
+        <p:nvSpPr>
+          <p:cNvPr id="15" name="Freeform: Shape 14">
+            <a:extLst>
+              <a:ext uri="{FF2B5EF4-FFF2-40B4-BE49-F238E27FC236}">
+                <a16:creationId xmlns:a16="http://schemas.microsoft.com/office/drawing/2014/main" id="{3B2B1500-BB55-471C-8A9E-67288297ECE1}"/>
+              </a:ext>
+              <a:ext uri="{C183D7F6-B498-43B3-948B-1728B52AA6E4}">
+                <adec:decorative xmlns:adec="http://schemas.microsoft.com/office/drawing/2017/decorative" val="1"/>
+              </a:ext>
+            </a:extLst>
+          </p:cNvPr>
+          <p:cNvSpPr>
+            <a:spLocks noGrp="1" noRot="1" noChangeAspect="1" noMove="1" noResize="1" noEditPoints="1" noAdjustHandles="1" noChangeArrowheads="1" noChangeShapeType="1" noTextEdit="1"/>
+          </p:cNvSpPr>
+          <p:nvPr>
+            <p:extLst>
+              <p:ext uri="{386F3935-93C4-4BCD-93E2-E3B085C9AB24}">
+                <p16:designElem xmlns:p16="http://schemas.microsoft.com/office/powerpoint/2015/main" val="1"/>
+              </p:ext>
+            </p:extLst>
+          </p:nvPr>
+        </p:nvSpPr>
+        <p:spPr>
+          <a:xfrm>
+            <a:off x="0" y="529224"/>
+            <a:ext cx="6305549" cy="6328777"/>
+          </a:xfrm>
+          <a:custGeom>
+            <a:avLst/>
+            <a:gdLst>
+              <a:gd name="connsiteX0" fmla="*/ 0 w 4212773"/>
+              <a:gd name="connsiteY0" fmla="*/ 0 h 6498740"/>
+              <a:gd name="connsiteX1" fmla="*/ 159023 w 4212773"/>
+              <a:gd name="connsiteY1" fmla="*/ 12872 h 6498740"/>
+              <a:gd name="connsiteX2" fmla="*/ 1697597 w 4212773"/>
+              <a:gd name="connsiteY2" fmla="*/ 306418 h 6498740"/>
+              <a:gd name="connsiteX3" fmla="*/ 4047822 w 4212773"/>
+              <a:gd name="connsiteY3" fmla="*/ 3511272 h 6498740"/>
+              <a:gd name="connsiteX4" fmla="*/ 3551503 w 4212773"/>
+              <a:gd name="connsiteY4" fmla="*/ 6184235 h 6498740"/>
+              <a:gd name="connsiteX5" fmla="*/ 3163159 w 4212773"/>
+              <a:gd name="connsiteY5" fmla="*/ 6459073 h 6498740"/>
+              <a:gd name="connsiteX6" fmla="*/ 3092077 w 4212773"/>
+              <a:gd name="connsiteY6" fmla="*/ 6498740 h 6498740"/>
+              <a:gd name="connsiteX7" fmla="*/ 0 w 4212773"/>
+              <a:gd name="connsiteY7" fmla="*/ 6498740 h 6498740"/>
+              <a:gd name="connsiteX8" fmla="*/ 0 w 4212773"/>
+              <a:gd name="connsiteY8" fmla="*/ 0 h 6498740"/>
+            </a:gdLst>
+            <a:ahLst/>
+            <a:cxnLst>
+              <a:cxn ang="0">
+                <a:pos x="connsiteX0" y="connsiteY0"/>
+              </a:cxn>
+              <a:cxn ang="0">
+                <a:pos x="connsiteX1" y="connsiteY1"/>
+              </a:cxn>
+              <a:cxn ang="0">
+                <a:pos x="connsiteX2" y="connsiteY2"/>
+              </a:cxn>
+              <a:cxn ang="0">
+                <a:pos x="connsiteX3" y="connsiteY3"/>
+              </a:cxn>
+              <a:cxn ang="0">
+                <a:pos x="connsiteX4" y="connsiteY4"/>
+              </a:cxn>
+              <a:cxn ang="0">
+                <a:pos x="connsiteX5" y="connsiteY5"/>
+              </a:cxn>
+              <a:cxn ang="0">
+                <a:pos x="connsiteX6" y="connsiteY6"/>
+              </a:cxn>
+              <a:cxn ang="0">
+                <a:pos x="connsiteX7" y="connsiteY7"/>
+              </a:cxn>
+              <a:cxn ang="0">
+                <a:pos x="connsiteX8" y="connsiteY8"/>
+              </a:cxn>
+            </a:cxnLst>
+            <a:rect l="l" t="t" r="r" b="b"/>
+            <a:pathLst>
+              <a:path w="4212773" h="6498740">
+                <a:moveTo>
+                  <a:pt x="0" y="0"/>
+                </a:moveTo>
+                <a:lnTo>
+                  <a:pt x="159023" y="12872"/>
+                </a:lnTo>
+                <a:cubicBezTo>
+                  <a:pt x="659101" y="63644"/>
+                  <a:pt x="1176498" y="175345"/>
+                  <a:pt x="1697597" y="306418"/>
+                </a:cubicBezTo>
+                <a:cubicBezTo>
+                  <a:pt x="3312474" y="712392"/>
+                  <a:pt x="3742395" y="1999786"/>
+                  <a:pt x="4047822" y="3511272"/>
+                </a:cubicBezTo>
+                <a:cubicBezTo>
+                  <a:pt x="4252232" y="4523358"/>
+                  <a:pt x="4422733" y="5443193"/>
+                  <a:pt x="3551503" y="6184235"/>
+                </a:cubicBezTo>
+                <a:cubicBezTo>
+                  <a:pt x="3429343" y="6288166"/>
+                  <a:pt x="3299185" y="6378784"/>
+                  <a:pt x="3163159" y="6459073"/>
+                </a:cubicBezTo>
+                <a:lnTo>
+                  <a:pt x="3092077" y="6498740"/>
+                </a:lnTo>
+                <a:lnTo>
+                  <a:pt x="0" y="6498740"/>
+                </a:lnTo>
+                <a:lnTo>
+                  <a:pt x="0" y="0"/>
+                </a:lnTo>
+                <a:close/>
+              </a:path>
+            </a:pathLst>
+          </a:custGeom>
+          <a:solidFill>
+            <a:schemeClr val="accent6"/>
+          </a:solidFill>
+          <a:ln>
+            <a:noFill/>
+          </a:ln>
+        </p:spPr>
+        <p:style>
+          <a:lnRef idx="2">
+            <a:schemeClr val="accent1">
+              <a:shade val="50000"/>
+            </a:schemeClr>
+          </a:lnRef>
+          <a:fillRef idx="1">
+            <a:schemeClr val="accent1"/>
+          </a:fillRef>
+          <a:effectRef idx="0">
+            <a:schemeClr val="accent1"/>
+          </a:effectRef>
+          <a:fontRef idx="minor">
+            <a:schemeClr val="lt1"/>
+          </a:fontRef>
+        </p:style>
+        <p:txBody>
+          <a:bodyPr rtlCol="0" anchor="ctr"/>
+          <a:lstStyle/>
+          <a:p>
+            <a:pPr algn="ctr"/>
+            <a:endParaRPr lang="en-US"/>
+          </a:p>
+        </p:txBody>
+      </p:sp>
+      <p:sp>
+        <p:nvSpPr>
+          <p:cNvPr id="17" name="Freeform: Shape 16">
+            <a:extLst>
+              <a:ext uri="{FF2B5EF4-FFF2-40B4-BE49-F238E27FC236}">
+                <a16:creationId xmlns:a16="http://schemas.microsoft.com/office/drawing/2014/main" id="{3045E22C-A99D-41BB-AF14-EF1B1E745A70}"/>
+              </a:ext>
+              <a:ext uri="{C183D7F6-B498-43B3-948B-1728B52AA6E4}">
+                <adec:decorative xmlns:adec="http://schemas.microsoft.com/office/drawing/2017/decorative" val="1"/>
+              </a:ext>
+            </a:extLst>
+          </p:cNvPr>
+          <p:cNvSpPr>
+            <a:spLocks noGrp="1" noRot="1" noChangeAspect="1" noMove="1" noResize="1" noEditPoints="1" noAdjustHandles="1" noChangeArrowheads="1" noChangeShapeType="1" noTextEdit="1"/>
+          </p:cNvSpPr>
+          <p:nvPr>
+            <p:extLst>
+              <p:ext uri="{386F3935-93C4-4BCD-93E2-E3B085C9AB24}">
+                <p16:designElem xmlns:p16="http://schemas.microsoft.com/office/powerpoint/2015/main" val="1"/>
+              </p:ext>
+            </p:extLst>
+          </p:nvPr>
+        </p:nvSpPr>
+        <p:spPr>
+          <a:xfrm>
+            <a:off x="0" y="136525"/>
+            <a:ext cx="6130391" cy="6721476"/>
+          </a:xfrm>
+          <a:custGeom>
+            <a:avLst/>
+            <a:gdLst>
+              <a:gd name="connsiteX0" fmla="*/ 0 w 4033589"/>
+              <a:gd name="connsiteY0" fmla="*/ 0 h 6858000"/>
+              <a:gd name="connsiteX1" fmla="*/ 1878934 w 4033589"/>
+              <a:gd name="connsiteY1" fmla="*/ 0 h 6858000"/>
+              <a:gd name="connsiteX2" fmla="*/ 1882313 w 4033589"/>
+              <a:gd name="connsiteY2" fmla="*/ 2021 h 6858000"/>
+              <a:gd name="connsiteX3" fmla="*/ 3475371 w 4033589"/>
+              <a:gd name="connsiteY3" fmla="*/ 1517967 h 6858000"/>
+              <a:gd name="connsiteX4" fmla="*/ 3975977 w 4033589"/>
+              <a:gd name="connsiteY4" fmla="*/ 4379386 h 6858000"/>
+              <a:gd name="connsiteX5" fmla="*/ 3312864 w 4033589"/>
+              <a:gd name="connsiteY5" fmla="*/ 6852362 h 6858000"/>
+              <a:gd name="connsiteX6" fmla="*/ 3310593 w 4033589"/>
+              <a:gd name="connsiteY6" fmla="*/ 6858000 h 6858000"/>
+              <a:gd name="connsiteX7" fmla="*/ 0 w 4033589"/>
+              <a:gd name="connsiteY7" fmla="*/ 6858000 h 6858000"/>
+              <a:gd name="connsiteX8" fmla="*/ 0 w 4033589"/>
+              <a:gd name="connsiteY8" fmla="*/ 0 h 6858000"/>
+              <a:gd name="connsiteX0" fmla="*/ 0 w 4033589"/>
+              <a:gd name="connsiteY0" fmla="*/ 6858000 h 6858000"/>
+              <a:gd name="connsiteX1" fmla="*/ 1878934 w 4033589"/>
+              <a:gd name="connsiteY1" fmla="*/ 0 h 6858000"/>
+              <a:gd name="connsiteX2" fmla="*/ 1882313 w 4033589"/>
+              <a:gd name="connsiteY2" fmla="*/ 2021 h 6858000"/>
+              <a:gd name="connsiteX3" fmla="*/ 3475371 w 4033589"/>
+              <a:gd name="connsiteY3" fmla="*/ 1517967 h 6858000"/>
+              <a:gd name="connsiteX4" fmla="*/ 3975977 w 4033589"/>
+              <a:gd name="connsiteY4" fmla="*/ 4379386 h 6858000"/>
+              <a:gd name="connsiteX5" fmla="*/ 3312864 w 4033589"/>
+              <a:gd name="connsiteY5" fmla="*/ 6852362 h 6858000"/>
+              <a:gd name="connsiteX6" fmla="*/ 3310593 w 4033589"/>
+              <a:gd name="connsiteY6" fmla="*/ 6858000 h 6858000"/>
+              <a:gd name="connsiteX7" fmla="*/ 0 w 4033589"/>
+              <a:gd name="connsiteY7" fmla="*/ 6858000 h 6858000"/>
+              <a:gd name="connsiteX0" fmla="*/ 1787494 w 3942149"/>
+              <a:gd name="connsiteY0" fmla="*/ 0 h 6949440"/>
+              <a:gd name="connsiteX1" fmla="*/ 1790873 w 3942149"/>
+              <a:gd name="connsiteY1" fmla="*/ 2021 h 6949440"/>
+              <a:gd name="connsiteX2" fmla="*/ 3383931 w 3942149"/>
+              <a:gd name="connsiteY2" fmla="*/ 1517967 h 6949440"/>
+              <a:gd name="connsiteX3" fmla="*/ 3884537 w 3942149"/>
+              <a:gd name="connsiteY3" fmla="*/ 4379386 h 6949440"/>
+              <a:gd name="connsiteX4" fmla="*/ 3221424 w 3942149"/>
+              <a:gd name="connsiteY4" fmla="*/ 6852362 h 6949440"/>
+              <a:gd name="connsiteX5" fmla="*/ 3219153 w 3942149"/>
+              <a:gd name="connsiteY5" fmla="*/ 6858000 h 6949440"/>
+              <a:gd name="connsiteX6" fmla="*/ 0 w 3942149"/>
+              <a:gd name="connsiteY6" fmla="*/ 6949440 h 6949440"/>
+              <a:gd name="connsiteX0" fmla="*/ 1787494 w 3942149"/>
+              <a:gd name="connsiteY0" fmla="*/ 0 h 6949440"/>
+              <a:gd name="connsiteX1" fmla="*/ 1790873 w 3942149"/>
+              <a:gd name="connsiteY1" fmla="*/ 2021 h 6949440"/>
+              <a:gd name="connsiteX2" fmla="*/ 3383931 w 3942149"/>
+              <a:gd name="connsiteY2" fmla="*/ 1517967 h 6949440"/>
+              <a:gd name="connsiteX3" fmla="*/ 3884537 w 3942149"/>
+              <a:gd name="connsiteY3" fmla="*/ 4379386 h 6949440"/>
+              <a:gd name="connsiteX4" fmla="*/ 3221424 w 3942149"/>
+              <a:gd name="connsiteY4" fmla="*/ 6852362 h 6949440"/>
+              <a:gd name="connsiteX5" fmla="*/ 3219153 w 3942149"/>
+              <a:gd name="connsiteY5" fmla="*/ 6858000 h 6949440"/>
+              <a:gd name="connsiteX6" fmla="*/ 0 w 3942149"/>
+              <a:gd name="connsiteY6" fmla="*/ 6949440 h 6949440"/>
+              <a:gd name="connsiteX0" fmla="*/ 0 w 2154655"/>
+              <a:gd name="connsiteY0" fmla="*/ 0 h 6858000"/>
+              <a:gd name="connsiteX1" fmla="*/ 3379 w 2154655"/>
+              <a:gd name="connsiteY1" fmla="*/ 2021 h 6858000"/>
+              <a:gd name="connsiteX2" fmla="*/ 1596437 w 2154655"/>
+              <a:gd name="connsiteY2" fmla="*/ 1517967 h 6858000"/>
+              <a:gd name="connsiteX3" fmla="*/ 2097043 w 2154655"/>
+              <a:gd name="connsiteY3" fmla="*/ 4379386 h 6858000"/>
+              <a:gd name="connsiteX4" fmla="*/ 1433930 w 2154655"/>
+              <a:gd name="connsiteY4" fmla="*/ 6852362 h 6858000"/>
+              <a:gd name="connsiteX5" fmla="*/ 1431659 w 2154655"/>
+              <a:gd name="connsiteY5" fmla="*/ 6858000 h 6858000"/>
+            </a:gdLst>
+            <a:ahLst/>
+            <a:cxnLst>
+              <a:cxn ang="0">
+                <a:pos x="connsiteX0" y="connsiteY0"/>
+              </a:cxn>
+              <a:cxn ang="0">
+                <a:pos x="connsiteX1" y="connsiteY1"/>
+              </a:cxn>
+              <a:cxn ang="0">
+                <a:pos x="connsiteX2" y="connsiteY2"/>
+              </a:cxn>
+              <a:cxn ang="0">
+                <a:pos x="connsiteX3" y="connsiteY3"/>
+              </a:cxn>
+              <a:cxn ang="0">
+                <a:pos x="connsiteX4" y="connsiteY4"/>
+              </a:cxn>
+              <a:cxn ang="0">
+                <a:pos x="connsiteX5" y="connsiteY5"/>
+              </a:cxn>
+            </a:cxnLst>
+            <a:rect l="l" t="t" r="r" b="b"/>
+            <a:pathLst>
+              <a:path w="2154655" h="6858000">
+                <a:moveTo>
+                  <a:pt x="0" y="0"/>
+                </a:moveTo>
+                <a:lnTo>
+                  <a:pt x="3379" y="2021"/>
+                </a:lnTo>
+                <a:cubicBezTo>
+                  <a:pt x="667061" y="423753"/>
+                  <a:pt x="1239365" y="963389"/>
+                  <a:pt x="1596437" y="1517967"/>
+                </a:cubicBezTo>
+                <a:cubicBezTo>
+                  <a:pt x="2133142" y="2350886"/>
+                  <a:pt x="2239839" y="3395752"/>
+                  <a:pt x="2097043" y="4379386"/>
+                </a:cubicBezTo>
+                <a:cubicBezTo>
+                  <a:pt x="2032295" y="4824358"/>
+                  <a:pt x="1812506" y="5869368"/>
+                  <a:pt x="1433930" y="6852362"/>
+                </a:cubicBezTo>
+                <a:lnTo>
+                  <a:pt x="1431659" y="6858000"/>
+                </a:lnTo>
+              </a:path>
+            </a:pathLst>
+          </a:custGeom>
+          <a:noFill/>
+          <a:ln w="19050">
+            <a:solidFill>
+              <a:schemeClr val="accent2">
+                <a:lumMod val="60000"/>
+                <a:lumOff val="40000"/>
+              </a:schemeClr>
+            </a:solidFill>
+          </a:ln>
+        </p:spPr>
+        <p:style>
+          <a:lnRef idx="2">
+            <a:schemeClr val="accent1">
+              <a:shade val="50000"/>
+            </a:schemeClr>
+          </a:lnRef>
+          <a:fillRef idx="1">
+            <a:schemeClr val="accent1"/>
+          </a:fillRef>
+          <a:effectRef idx="0">
+            <a:schemeClr val="accent1"/>
+          </a:effectRef>
+          <a:fontRef idx="minor">
+            <a:schemeClr val="lt1"/>
+          </a:fontRef>
+        </p:style>
+        <p:txBody>
+          <a:bodyPr rtlCol="0" anchor="ctr"/>
+          <a:lstStyle/>
+          <a:p>
+            <a:pPr algn="ctr"/>
+            <a:endParaRPr lang="en-US">
+              <a:solidFill>
+                <a:prstClr val="white"/>
+              </a:solidFill>
+              <a:latin typeface="Avenir Next LT Pro Light"/>
+            </a:endParaRPr>
+          </a:p>
+        </p:txBody>
+      </p:sp>
+      <p:sp>
+        <p:nvSpPr>
+          <p:cNvPr id="2" name="Title 1">
+            <a:extLst>
+              <a:ext uri="{FF2B5EF4-FFF2-40B4-BE49-F238E27FC236}">
+                <a16:creationId xmlns:a16="http://schemas.microsoft.com/office/drawing/2014/main" id="{D3B082F8-E0B2-439E-83A0-BAB575BDDCDF}"/>
+              </a:ext>
+            </a:extLst>
+          </p:cNvPr>
+          <p:cNvSpPr>
+            <a:spLocks noGrp="1"/>
+          </p:cNvSpPr>
+          <p:nvPr>
+            <p:ph type="title"/>
+          </p:nvPr>
+        </p:nvSpPr>
+        <p:spPr>
+          <a:xfrm>
+            <a:off x="762000" y="2299787"/>
+            <a:ext cx="4572000" cy="2286000"/>
+          </a:xfrm>
+        </p:spPr>
+        <p:txBody>
+          <a:bodyPr vert="horz" lIns="91440" tIns="45720" rIns="91440" bIns="45720" rtlCol="0" anchor="b">
+            <a:normAutofit/>
+          </a:bodyPr>
+          <a:lstStyle/>
+          <a:p>
+            <a:r>
+              <a:rPr lang="en-US" kern="1200" dirty="0">
+                <a:solidFill>
+                  <a:srgbClr val="FFFFFF"/>
+                </a:solidFill>
+                <a:latin typeface="+mj-lt"/>
+                <a:ea typeface="+mj-ea"/>
+                <a:cs typeface="+mj-cs"/>
+              </a:rPr>
+              <a:t>Thanks</a:t>
+            </a:r>
+          </a:p>
+        </p:txBody>
+      </p:sp>
+    </p:spTree>
+    <p:extLst>
+      <p:ext uri="{BB962C8B-B14F-4D97-AF65-F5344CB8AC3E}">
+        <p14:creationId xmlns:p14="http://schemas.microsoft.com/office/powerpoint/2010/main" val="3683026038"/>
+      </p:ext>
+    </p:extLst>
+  </p:cSld>
+  <p:clrMapOvr>
+    <a:masterClrMapping/>
+  </p:clrMapOvr>
+</p:sld>
+</file>
+
 <file path=ppt/theme/theme1.xml><?xml version="1.0" encoding="utf-8"?>
 <a:theme xmlns:a="http://schemas.openxmlformats.org/drawingml/2006/main" name="PebbleVTI">
   <a:themeElements>

</xml_diff>